<commit_message>
Add comment for chi-squared feature selection
</commit_message>
<xml_diff>
--- a/presentations/FeatureSelection.pptx
+++ b/presentations/FeatureSelection.pptx
@@ -299,7 +299,7 @@
           <a:p>
             <a:fld id="{F2853615-BFDE-46DE-814C-47EC6EF6D371}" type="datetimeFigureOut">
               <a:rPr lang="el-GR" smtClean="0"/>
-              <a:t>23/9/2018</a:t>
+              <a:t>16/2/2019</a:t>
             </a:fld>
             <a:endParaRPr lang="el-GR"/>
           </a:p>
@@ -499,7 +499,7 @@
           <a:p>
             <a:fld id="{F2853615-BFDE-46DE-814C-47EC6EF6D371}" type="datetimeFigureOut">
               <a:rPr lang="el-GR" smtClean="0"/>
-              <a:t>23/9/2018</a:t>
+              <a:t>16/2/2019</a:t>
             </a:fld>
             <a:endParaRPr lang="el-GR"/>
           </a:p>
@@ -674,7 +674,7 @@
           <a:p>
             <a:fld id="{F2853615-BFDE-46DE-814C-47EC6EF6D371}" type="datetimeFigureOut">
               <a:rPr lang="el-GR" smtClean="0"/>
-              <a:t>23/9/2018</a:t>
+              <a:t>16/2/2019</a:t>
             </a:fld>
             <a:endParaRPr lang="el-GR"/>
           </a:p>
@@ -839,7 +839,7 @@
           <a:p>
             <a:fld id="{F2853615-BFDE-46DE-814C-47EC6EF6D371}" type="datetimeFigureOut">
               <a:rPr lang="el-GR" smtClean="0"/>
-              <a:t>23/9/2018</a:t>
+              <a:t>16/2/2019</a:t>
             </a:fld>
             <a:endParaRPr lang="el-GR"/>
           </a:p>
@@ -978,7 +978,7 @@
           <a:p>
             <a:fld id="{F2853615-BFDE-46DE-814C-47EC6EF6D371}" type="datetimeFigureOut">
               <a:rPr lang="el-GR" smtClean="0"/>
-              <a:t>23/9/2018</a:t>
+              <a:t>16/2/2019</a:t>
             </a:fld>
             <a:endParaRPr lang="el-GR"/>
           </a:p>
@@ -1296,7 +1296,7 @@
           <a:p>
             <a:fld id="{F2853615-BFDE-46DE-814C-47EC6EF6D371}" type="datetimeFigureOut">
               <a:rPr lang="el-GR" smtClean="0"/>
-              <a:t>23/9/2018</a:t>
+              <a:t>16/2/2019</a:t>
             </a:fld>
             <a:endParaRPr lang="el-GR"/>
           </a:p>
@@ -1762,7 +1762,7 @@
           <a:p>
             <a:fld id="{F2853615-BFDE-46DE-814C-47EC6EF6D371}" type="datetimeFigureOut">
               <a:rPr lang="el-GR" smtClean="0"/>
-              <a:t>23/9/2018</a:t>
+              <a:t>16/2/2019</a:t>
             </a:fld>
             <a:endParaRPr lang="el-GR"/>
           </a:p>
@@ -1910,7 +1910,7 @@
           <a:p>
             <a:fld id="{F2853615-BFDE-46DE-814C-47EC6EF6D371}" type="datetimeFigureOut">
               <a:rPr lang="el-GR" smtClean="0"/>
-              <a:t>23/9/2018</a:t>
+              <a:t>16/2/2019</a:t>
             </a:fld>
             <a:endParaRPr lang="el-GR"/>
           </a:p>
@@ -2000,7 +2000,7 @@
           <a:p>
             <a:fld id="{F2853615-BFDE-46DE-814C-47EC6EF6D371}" type="datetimeFigureOut">
               <a:rPr lang="el-GR" smtClean="0"/>
-              <a:t>23/9/2018</a:t>
+              <a:t>16/2/2019</a:t>
             </a:fld>
             <a:endParaRPr lang="el-GR"/>
           </a:p>
@@ -2274,7 +2274,7 @@
           <a:p>
             <a:fld id="{F2853615-BFDE-46DE-814C-47EC6EF6D371}" type="datetimeFigureOut">
               <a:rPr lang="el-GR" smtClean="0"/>
-              <a:t>23/9/2018</a:t>
+              <a:t>16/2/2019</a:t>
             </a:fld>
             <a:endParaRPr lang="el-GR"/>
           </a:p>
@@ -2579,7 +2579,7 @@
           <a:p>
             <a:fld id="{F2853615-BFDE-46DE-814C-47EC6EF6D371}" type="datetimeFigureOut">
               <a:rPr lang="el-GR" smtClean="0"/>
-              <a:t>23/9/2018</a:t>
+              <a:t>16/2/2019</a:t>
             </a:fld>
             <a:endParaRPr lang="el-GR"/>
           </a:p>
@@ -2877,7 +2877,7 @@
           <a:p>
             <a:fld id="{F2853615-BFDE-46DE-814C-47EC6EF6D371}" type="datetimeFigureOut">
               <a:rPr lang="el-GR" smtClean="0"/>
-              <a:t>23/9/2018</a:t>
+              <a:t>16/2/2019</a:t>
             </a:fld>
             <a:endParaRPr lang="el-GR"/>
           </a:p>
@@ -3705,7 +3705,7 @@
           <a:graphicData uri="http://schemas.openxmlformats.org/presentationml/2006/ole">
             <mc:AlternateContent xmlns:mc="http://schemas.openxmlformats.org/markup-compatibility/2006">
               <mc:Choice xmlns:v="urn:schemas-microsoft-com:vml" Requires="v">
-                <p:oleObj spid="_x0000_s3180" name="Equation" r:id="rId3" imgW="1562040" imgH="355320" progId="Equation.DSMT4">
+                <p:oleObj spid="_x0000_s3183" name="Equation" r:id="rId3" imgW="1562040" imgH="355320" progId="Equation.DSMT4">
                   <p:embed/>
                 </p:oleObj>
               </mc:Choice>
@@ -3788,7 +3788,7 @@
           <a:graphicData uri="http://schemas.openxmlformats.org/presentationml/2006/ole">
             <mc:AlternateContent xmlns:mc="http://schemas.openxmlformats.org/markup-compatibility/2006">
               <mc:Choice xmlns:v="urn:schemas-microsoft-com:vml" Requires="v">
-                <p:oleObj spid="_x0000_s3181" name="Equation" r:id="rId5" imgW="2260440" imgH="304560" progId="Equation.DSMT4">
+                <p:oleObj spid="_x0000_s3184" name="Equation" r:id="rId5" imgW="2260440" imgH="304560" progId="Equation.DSMT4">
                   <p:embed/>
                 </p:oleObj>
               </mc:Choice>
@@ -3877,7 +3877,7 @@
           <a:graphicData uri="http://schemas.openxmlformats.org/presentationml/2006/ole">
             <mc:AlternateContent xmlns:mc="http://schemas.openxmlformats.org/markup-compatibility/2006">
               <mc:Choice xmlns:v="urn:schemas-microsoft-com:vml" Requires="v">
-                <p:oleObj spid="_x0000_s3182" name="Equation" r:id="rId7" imgW="1854000" imgH="507960" progId="Equation.DSMT4">
+                <p:oleObj spid="_x0000_s3185" name="Equation" r:id="rId7" imgW="1854000" imgH="507960" progId="Equation.DSMT4">
                   <p:embed/>
                 </p:oleObj>
               </mc:Choice>
@@ -4158,15 +4158,7 @@
             </a:pPr>
             <a:r>
               <a:rPr lang="en-GB" sz="1200" dirty="0" smtClean="0"/>
-              <a:t>Source: </a:t>
-            </a:r>
-            <a:r>
-              <a:rPr lang="en-GB" sz="1200" dirty="0" smtClean="0"/>
-              <a:t>	</a:t>
-            </a:r>
-            <a:r>
-              <a:rPr lang="en-GB" sz="1200" dirty="0" smtClean="0"/>
-              <a:t>https</a:t>
+              <a:t>Source: 	https</a:t>
             </a:r>
             <a:r>
               <a:rPr lang="en-GB" sz="1200" dirty="0"/>
@@ -4431,7 +4423,33 @@
           <a:p>
             <a:r>
               <a:rPr lang="en-US" dirty="0" smtClean="0"/>
-              <a:t>Example:</a:t>
+              <a:t>Example</a:t>
+            </a:r>
+            <a:r>
+              <a:rPr lang="en-US" dirty="0" smtClean="0"/>
+              <a:t>:</a:t>
+            </a:r>
+          </a:p>
+          <a:p>
+            <a:endParaRPr lang="en-US" dirty="0"/>
+          </a:p>
+          <a:p>
+            <a:endParaRPr lang="en-US" dirty="0" smtClean="0"/>
+          </a:p>
+          <a:p>
+            <a:r>
+              <a:rPr lang="en-US" dirty="0"/>
+              <a:t>Higher dependence </a:t>
+            </a:r>
+            <a:r>
+              <a:rPr lang="en-US" dirty="0">
+                <a:sym typeface="Wingdings" pitchFamily="2" charset="2"/>
+              </a:rPr>
+              <a:t> </a:t>
+            </a:r>
+            <a:r>
+              <a:rPr lang="en-US" dirty="0" smtClean="0"/>
+              <a:t>Higher chi-squared</a:t>
             </a:r>
             <a:endParaRPr lang="el-GR" dirty="0"/>
           </a:p>
@@ -4459,7 +4477,7 @@
           <a:graphicData uri="http://schemas.openxmlformats.org/presentationml/2006/ole">
             <mc:AlternateContent xmlns:mc="http://schemas.openxmlformats.org/markup-compatibility/2006">
               <mc:Choice xmlns:v="urn:schemas-microsoft-com:vml" Requires="v">
-                <p:oleObj spid="_x0000_s5134" name="Equation" r:id="rId3" imgW="1117440" imgH="495000" progId="Equation.DSMT4">
+                <p:oleObj spid="_x0000_s5136" name="Equation" r:id="rId3" imgW="1117440" imgH="495000" progId="Equation.DSMT4">
                   <p:embed/>
                 </p:oleObj>
               </mc:Choice>
@@ -4813,11 +4831,7 @@
                       <a:pPr algn="ctr"/>
                       <a:r>
                         <a:rPr lang="en-US" sz="1900" dirty="0" smtClean="0"/>
-                        <a:t>Don’t </a:t>
-                      </a:r>
-                      <a:r>
-                        <a:rPr lang="en-US" sz="1900" dirty="0" smtClean="0"/>
-                        <a:t>Like Science Fiction</a:t>
+                        <a:t>Don’t Like Science Fiction</a:t>
                       </a:r>
                       <a:endParaRPr lang="el-GR" sz="1900" dirty="0"/>
                     </a:p>
@@ -5014,7 +5028,7 @@
           <a:graphicData uri="http://schemas.openxmlformats.org/presentationml/2006/ole">
             <mc:AlternateContent xmlns:mc="http://schemas.openxmlformats.org/markup-compatibility/2006">
               <mc:Choice xmlns:v="urn:schemas-microsoft-com:vml" Requires="v">
-                <p:oleObj spid="_x0000_s5135" name="Equation" r:id="rId5" imgW="4381200" imgH="457200" progId="Equation.DSMT4">
+                <p:oleObj spid="_x0000_s5137" name="Equation" r:id="rId5" imgW="4381200" imgH="457200" progId="Equation.DSMT4">
                   <p:embed/>
                 </p:oleObj>
               </mc:Choice>

</xml_diff>